<commit_message>
Bug fixes and stuff
Former-commit-id: a39ddfe4a5ed1226b0d5c642dbd6b52ce5ead5e4
</commit_message>
<xml_diff>
--- a/PS/Pres/PlayersNet Apresentação Final.pptx
+++ b/PS/Pres/PlayersNet Apresentação Final.pptx
@@ -1122,7 +1122,7 @@
               <a:t>aqui</a:t>
             </a:r>
             <a:r>
-              <a:rPr lang="en-US"/>
+              <a:rPr lang="en-US" dirty="0"/>
               <a:t> …</a:t>
             </a:r>
           </a:p>
@@ -6609,7 +6609,15 @@
             </a:r>
             <a:r>
               <a:rPr lang="en-US" dirty="0"/>
-              <a:t> detriment de if’s e </a:t>
+              <a:t> </a:t>
+            </a:r>
+            <a:r>
+              <a:rPr lang="en-US" dirty="0" err="1"/>
+              <a:t>detrimento</a:t>
+            </a:r>
+            <a:r>
+              <a:rPr lang="en-US" dirty="0"/>
+              <a:t> de if’s e </a:t>
             </a:r>
             <a:r>
               <a:rPr lang="en-US" dirty="0" err="1"/>

</xml_diff>